<commit_message>
added Community Detection slide
</commit_message>
<xml_diff>
--- a/ads_lda_presentation.pptx
+++ b/ads_lda_presentation.pptx
@@ -12,7 +12,8 @@
     <p:sldId id="261" r:id="rId6"/>
     <p:sldId id="265" r:id="rId7"/>
     <p:sldId id="262" r:id="rId8"/>
-    <p:sldId id="264" r:id="rId9"/>
+    <p:sldId id="266" r:id="rId9"/>
+    <p:sldId id="264" r:id="rId10"/>
   </p:sldIdLst>
   <p:sldSz cx="12192000" cy="6858000"/>
   <p:notesSz cx="6858000" cy="9144000"/>
@@ -250,7 +251,7 @@
           <a:p>
             <a:fld id="{8D804A89-3A9B-8B4C-8731-96C945E7C61F}" type="datetimeFigureOut">
               <a:rPr lang="en-US" smtClean="0"/>
-              <a:t>8/25/16</a:t>
+              <a:t>8/29/16</a:t>
             </a:fld>
             <a:endParaRPr lang="en-US"/>
           </a:p>
@@ -420,7 +421,7 @@
           <a:p>
             <a:fld id="{8D804A89-3A9B-8B4C-8731-96C945E7C61F}" type="datetimeFigureOut">
               <a:rPr lang="en-US" smtClean="0"/>
-              <a:t>8/25/16</a:t>
+              <a:t>8/29/16</a:t>
             </a:fld>
             <a:endParaRPr lang="en-US"/>
           </a:p>
@@ -600,7 +601,7 @@
           <a:p>
             <a:fld id="{8D804A89-3A9B-8B4C-8731-96C945E7C61F}" type="datetimeFigureOut">
               <a:rPr lang="en-US" smtClean="0"/>
-              <a:t>8/25/16</a:t>
+              <a:t>8/29/16</a:t>
             </a:fld>
             <a:endParaRPr lang="en-US"/>
           </a:p>
@@ -770,7 +771,7 @@
           <a:p>
             <a:fld id="{8D804A89-3A9B-8B4C-8731-96C945E7C61F}" type="datetimeFigureOut">
               <a:rPr lang="en-US" smtClean="0"/>
-              <a:t>8/25/16</a:t>
+              <a:t>8/29/16</a:t>
             </a:fld>
             <a:endParaRPr lang="en-US"/>
           </a:p>
@@ -1016,7 +1017,7 @@
           <a:p>
             <a:fld id="{8D804A89-3A9B-8B4C-8731-96C945E7C61F}" type="datetimeFigureOut">
               <a:rPr lang="en-US" smtClean="0"/>
-              <a:t>8/25/16</a:t>
+              <a:t>8/29/16</a:t>
             </a:fld>
             <a:endParaRPr lang="en-US"/>
           </a:p>
@@ -1248,7 +1249,7 @@
           <a:p>
             <a:fld id="{8D804A89-3A9B-8B4C-8731-96C945E7C61F}" type="datetimeFigureOut">
               <a:rPr lang="en-US" smtClean="0"/>
-              <a:t>8/25/16</a:t>
+              <a:t>8/29/16</a:t>
             </a:fld>
             <a:endParaRPr lang="en-US"/>
           </a:p>
@@ -1615,7 +1616,7 @@
           <a:p>
             <a:fld id="{8D804A89-3A9B-8B4C-8731-96C945E7C61F}" type="datetimeFigureOut">
               <a:rPr lang="en-US" smtClean="0"/>
-              <a:t>8/25/16</a:t>
+              <a:t>8/29/16</a:t>
             </a:fld>
             <a:endParaRPr lang="en-US"/>
           </a:p>
@@ -1733,7 +1734,7 @@
           <a:p>
             <a:fld id="{8D804A89-3A9B-8B4C-8731-96C945E7C61F}" type="datetimeFigureOut">
               <a:rPr lang="en-US" smtClean="0"/>
-              <a:t>8/25/16</a:t>
+              <a:t>8/29/16</a:t>
             </a:fld>
             <a:endParaRPr lang="en-US"/>
           </a:p>
@@ -1828,7 +1829,7 @@
           <a:p>
             <a:fld id="{8D804A89-3A9B-8B4C-8731-96C945E7C61F}" type="datetimeFigureOut">
               <a:rPr lang="en-US" smtClean="0"/>
-              <a:t>8/25/16</a:t>
+              <a:t>8/29/16</a:t>
             </a:fld>
             <a:endParaRPr lang="en-US"/>
           </a:p>
@@ -2105,7 +2106,7 @@
           <a:p>
             <a:fld id="{8D804A89-3A9B-8B4C-8731-96C945E7C61F}" type="datetimeFigureOut">
               <a:rPr lang="en-US" smtClean="0"/>
-              <a:t>8/25/16</a:t>
+              <a:t>8/29/16</a:t>
             </a:fld>
             <a:endParaRPr lang="en-US"/>
           </a:p>
@@ -2358,7 +2359,7 @@
           <a:p>
             <a:fld id="{8D804A89-3A9B-8B4C-8731-96C945E7C61F}" type="datetimeFigureOut">
               <a:rPr lang="en-US" smtClean="0"/>
-              <a:t>8/25/16</a:t>
+              <a:t>8/29/16</a:t>
             </a:fld>
             <a:endParaRPr lang="en-US"/>
           </a:p>
@@ -2571,7 +2572,7 @@
           <a:p>
             <a:fld id="{8D804A89-3A9B-8B4C-8731-96C945E7C61F}" type="datetimeFigureOut">
               <a:rPr lang="en-US" smtClean="0"/>
-              <a:t>8/25/16</a:t>
+              <a:t>8/29/16</a:t>
             </a:fld>
             <a:endParaRPr lang="en-US"/>
           </a:p>
@@ -3091,6 +3092,13 @@
   <p:clrMapOvr>
     <a:masterClrMapping/>
   </p:clrMapOvr>
+  <p:timing>
+    <p:tnLst>
+      <p:par>
+        <p:cTn id="1" dur="indefinite" restart="never" nodeType="tmRoot"/>
+      </p:par>
+    </p:tnLst>
+  </p:timing>
 </p:sld>
 </file>
 
@@ -3160,7 +3168,6 @@
               <a:rPr lang="en-US" dirty="0" smtClean="0"/>
               <a:t>Motivation</a:t>
             </a:r>
-            <a:endParaRPr lang="en-US" dirty="0" smtClean="0"/>
           </a:p>
           <a:p>
             <a:r>
@@ -3197,30 +3204,10 @@
             </a:r>
           </a:p>
           <a:p>
-            <a:pPr lvl="1"/>
-            <a:r>
-              <a:rPr lang="en-US" dirty="0"/>
-              <a:t>Equations</a:t>
-            </a:r>
-          </a:p>
-          <a:p>
-            <a:pPr lvl="1"/>
-            <a:r>
-              <a:rPr lang="en-US" dirty="0"/>
-              <a:t>Spark </a:t>
-            </a:r>
-            <a:r>
-              <a:rPr lang="en-US" dirty="0" err="1" smtClean="0"/>
-              <a:t>Hyperparameter</a:t>
-            </a:r>
-            <a:endParaRPr lang="en-US" dirty="0" smtClean="0"/>
-          </a:p>
-          <a:p>
             <a:r>
               <a:rPr lang="en-US" dirty="0" smtClean="0"/>
-              <a:t>Document Similarity and Visualization</a:t>
-            </a:r>
-            <a:endParaRPr lang="en-US" dirty="0" smtClean="0"/>
+              <a:t>Document Similarity and Community Detection</a:t>
+            </a:r>
           </a:p>
           <a:p>
             <a:pPr marL="457200" lvl="1" indent="0">
@@ -3243,6 +3230,13 @@
   <p:clrMapOvr>
     <a:masterClrMapping/>
   </p:clrMapOvr>
+  <p:timing>
+    <p:tnLst>
+      <p:par>
+        <p:cTn id="1" dur="indefinite" restart="never" nodeType="tmRoot"/>
+      </p:par>
+    </p:tnLst>
+  </p:timing>
 </p:sld>
 </file>
 
@@ -3280,11 +3274,7 @@
           <a:p>
             <a:r>
               <a:rPr lang="en-US" dirty="0" smtClean="0"/>
-              <a:t>Motivation</a:t>
-            </a:r>
-            <a:r>
-              <a:rPr lang="en-US" dirty="0" smtClean="0"/>
-              <a:t>	</a:t>
+              <a:t>Motivation	</a:t>
             </a:r>
             <a:endParaRPr lang="en-US" dirty="0"/>
           </a:p>
@@ -3377,6 +3367,13 @@
   <p:clrMapOvr>
     <a:masterClrMapping/>
   </p:clrMapOvr>
+  <p:timing>
+    <p:tnLst>
+      <p:par>
+        <p:cTn id="1" dur="indefinite" restart="never" nodeType="tmRoot"/>
+      </p:par>
+    </p:tnLst>
+  </p:timing>
 </p:sld>
 </file>
 
@@ -3414,11 +3411,7 @@
           <a:p>
             <a:r>
               <a:rPr lang="en-US" dirty="0" smtClean="0"/>
-              <a:t>Data Pipeline</a:t>
-            </a:r>
-            <a:r>
-              <a:rPr lang="en-US" dirty="0" smtClean="0"/>
-              <a:t>	</a:t>
+              <a:t>Data Pipeline	</a:t>
             </a:r>
             <a:endParaRPr lang="en-US" dirty="0"/>
           </a:p>
@@ -3449,8 +3442,8 @@
         </p:blipFill>
         <p:spPr bwMode="auto">
           <a:xfrm>
-            <a:off x="2271106" y="1690688"/>
-            <a:ext cx="7444395" cy="3231818"/>
+            <a:off x="1513869" y="1690688"/>
+            <a:ext cx="8187344" cy="3652837"/>
           </a:xfrm>
           <a:prstGeom prst="rect">
             <a:avLst/>
@@ -3525,6 +3518,13 @@
   <p:clrMapOvr>
     <a:masterClrMapping/>
   </p:clrMapOvr>
+  <p:timing>
+    <p:tnLst>
+      <p:par>
+        <p:cTn id="1" dur="indefinite" restart="never" nodeType="tmRoot"/>
+      </p:par>
+    </p:tnLst>
+  </p:timing>
 </p:sld>
 </file>
 
@@ -3744,6 +3744,13 @@
   <p:clrMapOvr>
     <a:masterClrMapping/>
   </p:clrMapOvr>
+  <p:timing>
+    <p:tnLst>
+      <p:par>
+        <p:cTn id="1" dur="indefinite" restart="never" nodeType="tmRoot"/>
+      </p:par>
+    </p:tnLst>
+  </p:timing>
 </p:sld>
 </file>
 
@@ -3886,14 +3893,54 @@
             <a:pPr lvl="1" fontAlgn="base"/>
             <a:r>
               <a:rPr lang="en-US" dirty="0"/>
-              <a:t>First picking a topic (according to the multinomial distribution that you sampled above; for example, you might pick the food topic with 1/3 probability and the cute animals topic with 2/3 probability).</a:t>
+              <a:t>First picking a topic (according to the multinomial distribution that you sampled above; for example, you might pick the </a:t>
+            </a:r>
+            <a:r>
+              <a:rPr lang="en-US" dirty="0" smtClean="0"/>
+              <a:t>Physics with </a:t>
+            </a:r>
+            <a:r>
+              <a:rPr lang="en-US" dirty="0"/>
+              <a:t>1/3 probability and the </a:t>
+            </a:r>
+            <a:r>
+              <a:rPr lang="en-US" dirty="0" smtClean="0"/>
+              <a:t>Chemistry </a:t>
+            </a:r>
+            <a:r>
+              <a:rPr lang="en-US" dirty="0"/>
+              <a:t>topic with 2/3 probability).</a:t>
             </a:r>
           </a:p>
           <a:p>
             <a:pPr lvl="1" fontAlgn="base"/>
             <a:r>
               <a:rPr lang="en-US" dirty="0"/>
-              <a:t>Using the topic to generate the word itself (according to the topic’s multinomial distribution). For example, if we selected the food topic, we might generate the word “broccoli” with 30% probability, “bananas” with 15% probability, and so on.</a:t>
+              <a:t>Using the topic to generate the word itself (according to the topic’s multinomial distribution). For example, if we selected the </a:t>
+            </a:r>
+            <a:r>
+              <a:rPr lang="en-US" dirty="0" err="1" smtClean="0"/>
+              <a:t>Physicstopic</a:t>
+            </a:r>
+            <a:r>
+              <a:rPr lang="en-US" dirty="0"/>
+              <a:t>, we might generate the word </a:t>
+            </a:r>
+            <a:r>
+              <a:rPr lang="en-US" dirty="0" smtClean="0"/>
+              <a:t>“gravity” </a:t>
+            </a:r>
+            <a:r>
+              <a:rPr lang="en-US" dirty="0"/>
+              <a:t>with 30% probability, </a:t>
+            </a:r>
+            <a:r>
+              <a:rPr lang="en-US" dirty="0" smtClean="0"/>
+              <a:t>“stars” </a:t>
+            </a:r>
+            <a:r>
+              <a:rPr lang="en-US" dirty="0"/>
+              <a:t>with 15% probability, and so on.</a:t>
             </a:r>
           </a:p>
           <a:p>
@@ -3914,6 +3961,13 @@
   <p:clrMapOvr>
     <a:masterClrMapping/>
   </p:clrMapOvr>
+  <p:timing>
+    <p:tnLst>
+      <p:par>
+        <p:cTn id="1" dur="indefinite" restart="never" nodeType="tmRoot"/>
+      </p:par>
+    </p:tnLst>
+  </p:timing>
 </p:sld>
 </file>
 
@@ -3951,7 +4005,7 @@
           <a:p>
             <a:r>
               <a:rPr lang="en-US" dirty="0" smtClean="0"/>
-              <a:t>Document Similarity and Community Detection</a:t>
+              <a:t>Document Similarity</a:t>
             </a:r>
             <a:endParaRPr lang="en-US" dirty="0"/>
           </a:p>
@@ -4193,6 +4247,13 @@
   <p:clrMapOvr>
     <a:masterClrMapping/>
   </p:clrMapOvr>
+  <p:timing>
+    <p:tnLst>
+      <p:par>
+        <p:cTn id="1" dur="indefinite" restart="never" nodeType="tmRoot"/>
+      </p:par>
+    </p:tnLst>
+  </p:timing>
 </p:sld>
 </file>
 
@@ -4216,6 +4277,199 @@
       <p:sp>
         <p:nvSpPr>
           <p:cNvPr id="2" name="Title 1"/>
+          <p:cNvSpPr>
+            <a:spLocks noGrp="1"/>
+          </p:cNvSpPr>
+          <p:nvPr>
+            <p:ph type="title"/>
+          </p:nvPr>
+        </p:nvSpPr>
+        <p:spPr/>
+        <p:txBody>
+          <a:bodyPr/>
+          <a:lstStyle/>
+          <a:p>
+            <a:r>
+              <a:rPr lang="en-US" dirty="0" smtClean="0"/>
+              <a:t>Community Detection</a:t>
+            </a:r>
+            <a:endParaRPr lang="en-US" dirty="0"/>
+          </a:p>
+        </p:txBody>
+      </p:sp>
+      <p:sp>
+        <p:nvSpPr>
+          <p:cNvPr id="3" name="Content Placeholder 2"/>
+          <p:cNvSpPr>
+            <a:spLocks noGrp="1"/>
+          </p:cNvSpPr>
+          <p:nvPr>
+            <p:ph idx="1"/>
+          </p:nvPr>
+        </p:nvSpPr>
+        <p:spPr>
+          <a:xfrm>
+            <a:off x="300037" y="1543050"/>
+            <a:ext cx="11053763" cy="4633913"/>
+          </a:xfrm>
+        </p:spPr>
+        <p:txBody>
+          <a:bodyPr>
+            <a:normAutofit fontScale="92500" lnSpcReduction="10000"/>
+          </a:bodyPr>
+          <a:lstStyle/>
+          <a:p>
+            <a:pPr marL="0" indent="0" algn="ctr">
+              <a:buNone/>
+            </a:pPr>
+            <a:r>
+              <a:rPr lang="en-US" dirty="0"/>
+              <a:t>1:1:1 0.0384615 "7" 6 </a:t>
+            </a:r>
+          </a:p>
+          <a:p>
+            <a:pPr marL="0" indent="0" algn="ctr">
+              <a:buNone/>
+            </a:pPr>
+            <a:r>
+              <a:rPr lang="en-US" dirty="0" smtClean="0"/>
+              <a:t>1:1:2 </a:t>
+            </a:r>
+            <a:r>
+              <a:rPr lang="en-US" dirty="0"/>
+              <a:t>0.0384615 "8" 7 </a:t>
+            </a:r>
+            <a:endParaRPr lang="en-US" dirty="0" smtClean="0"/>
+          </a:p>
+          <a:p>
+            <a:pPr marL="0" indent="0" algn="ctr">
+              <a:buNone/>
+            </a:pPr>
+            <a:r>
+              <a:rPr lang="en-US" dirty="0" smtClean="0"/>
+              <a:t>1:1:3 </a:t>
+            </a:r>
+            <a:r>
+              <a:rPr lang="en-US" dirty="0"/>
+              <a:t>0.0384615 "9" 8 </a:t>
+            </a:r>
+            <a:endParaRPr lang="en-US" dirty="0" smtClean="0"/>
+          </a:p>
+          <a:p>
+            <a:pPr marL="0" indent="0">
+              <a:buNone/>
+            </a:pPr>
+            <a:r>
+              <a:rPr lang="en-US" dirty="0" smtClean="0"/>
+              <a:t>- Each </a:t>
+            </a:r>
+            <a:r>
+              <a:rPr lang="en-US" dirty="0"/>
+              <a:t>row </a:t>
+            </a:r>
+            <a:r>
+              <a:rPr lang="en-US" dirty="0" smtClean="0"/>
+              <a:t>begins </a:t>
+            </a:r>
+            <a:r>
+              <a:rPr lang="en-US" dirty="0"/>
+              <a:t>with the multilevel module assignments of a node. The module assignments are colon separated from coarse to fine level, and all modules within each level are sorted by the total flow (PageRank) of the nodes they contain. </a:t>
+            </a:r>
+            <a:endParaRPr lang="en-US" dirty="0" smtClean="0"/>
+          </a:p>
+          <a:p>
+            <a:pPr marL="0" indent="0">
+              <a:buNone/>
+            </a:pPr>
+            <a:r>
+              <a:rPr lang="en-US" dirty="0" smtClean="0"/>
+              <a:t>- Further</a:t>
+            </a:r>
+            <a:r>
+              <a:rPr lang="en-US" dirty="0"/>
+              <a:t>, the integer after the last colon is the rank within the finest-level module, the decimal number is the amount of flow in that node, i.e. the steady state population of random walkers, the content within quotation marks is the node name, and finally, the last integer is the index of the node in the original network file.</a:t>
+            </a:r>
+          </a:p>
+        </p:txBody>
+      </p:sp>
+      <p:sp>
+        <p:nvSpPr>
+          <p:cNvPr id="4" name="TextBox 3"/>
+          <p:cNvSpPr txBox="1"/>
+          <p:nvPr/>
+        </p:nvSpPr>
+        <p:spPr>
+          <a:xfrm>
+            <a:off x="300037" y="6248069"/>
+            <a:ext cx="6600825" cy="369332"/>
+          </a:xfrm>
+          <a:prstGeom prst="rect">
+            <a:avLst/>
+          </a:prstGeom>
+          <a:noFill/>
+        </p:spPr>
+        <p:txBody>
+          <a:bodyPr wrap="square" rtlCol="0">
+            <a:spAutoFit/>
+          </a:bodyPr>
+          <a:lstStyle/>
+          <a:p>
+            <a:r>
+              <a:rPr lang="en-US" i="1" dirty="0" smtClean="0">
+                <a:solidFill>
+                  <a:schemeClr val="accent2"/>
+                </a:solidFill>
+              </a:rPr>
+              <a:t>Build hash-table out of similarity matrix</a:t>
+            </a:r>
+            <a:endParaRPr lang="en-US" i="1" dirty="0">
+              <a:solidFill>
+                <a:schemeClr val="accent2"/>
+              </a:solidFill>
+            </a:endParaRPr>
+          </a:p>
+        </p:txBody>
+      </p:sp>
+    </p:spTree>
+    <p:extLst>
+      <p:ext uri="{BB962C8B-B14F-4D97-AF65-F5344CB8AC3E}">
+        <p14:creationId xmlns:p14="http://schemas.microsoft.com/office/powerpoint/2010/main" val="150593535"/>
+      </p:ext>
+    </p:extLst>
+  </p:cSld>
+  <p:clrMapOvr>
+    <a:masterClrMapping/>
+  </p:clrMapOvr>
+  <p:timing>
+    <p:tnLst>
+      <p:par>
+        <p:cTn id="1" dur="indefinite" restart="never" nodeType="tmRoot"/>
+      </p:par>
+    </p:tnLst>
+  </p:timing>
+</p:sld>
+</file>
+
+<file path=ppt/slides/slide9.xml><?xml version="1.0" encoding="utf-8"?>
+<p:sld xmlns:a="http://schemas.openxmlformats.org/drawingml/2006/main" xmlns:r="http://schemas.openxmlformats.org/officeDocument/2006/relationships" xmlns:p="http://schemas.openxmlformats.org/presentationml/2006/main">
+  <p:cSld>
+    <p:spTree>
+      <p:nvGrpSpPr>
+        <p:cNvPr id="1" name=""/>
+        <p:cNvGrpSpPr/>
+        <p:nvPr/>
+      </p:nvGrpSpPr>
+      <p:grpSpPr>
+        <a:xfrm>
+          <a:off x="0" y="0"/>
+          <a:ext cx="0" cy="0"/>
+          <a:chOff x="0" y="0"/>
+          <a:chExt cx="0" cy="0"/>
+        </a:xfrm>
+      </p:grpSpPr>
+      <p:sp>
+        <p:nvSpPr>
+          <p:cNvPr id="2" name="Title 1"/>
           <p:cNvSpPr txBox="1">
             <a:spLocks/>
           </p:cNvSpPr>
@@ -4271,6 +4525,13 @@
   <p:clrMapOvr>
     <a:masterClrMapping/>
   </p:clrMapOvr>
+  <p:timing>
+    <p:tnLst>
+      <p:par>
+        <p:cTn id="1" dur="indefinite" restart="never" nodeType="tmRoot"/>
+      </p:par>
+    </p:tnLst>
+  </p:timing>
 </p:sld>
 </file>
 

</xml_diff>